<commit_message>
Modified heading in ppt
</commit_message>
<xml_diff>
--- a/vodqa.pptx
+++ b/vodqa.pptx
@@ -227,11 +227,11 @@
         </c:dLbls>
         <c:marker val="1"/>
         <c:smooth val="0"/>
-        <c:axId val="-2068576872"/>
-        <c:axId val="-2068573928"/>
+        <c:axId val="-2065856248"/>
+        <c:axId val="-2110963368"/>
       </c:lineChart>
       <c:catAx>
-        <c:axId val="-2068576872"/>
+        <c:axId val="-2065856248"/>
         <c:scaling>
           <c:orientation val="minMax"/>
         </c:scaling>
@@ -240,7 +240,7 @@
         <c:majorTickMark val="out"/>
         <c:minorTickMark val="none"/>
         <c:tickLblPos val="nextTo"/>
-        <c:crossAx val="-2068573928"/>
+        <c:crossAx val="-2110963368"/>
         <c:crosses val="autoZero"/>
         <c:auto val="1"/>
         <c:lblAlgn val="ctr"/>
@@ -248,7 +248,7 @@
         <c:noMultiLvlLbl val="0"/>
       </c:catAx>
       <c:valAx>
-        <c:axId val="-2068573928"/>
+        <c:axId val="-2110963368"/>
         <c:scaling>
           <c:orientation val="minMax"/>
         </c:scaling>
@@ -259,7 +259,7 @@
         <c:majorTickMark val="out"/>
         <c:minorTickMark val="none"/>
         <c:tickLblPos val="nextTo"/>
-        <c:crossAx val="-2068576872"/>
+        <c:crossAx val="-2065856248"/>
         <c:crosses val="autoZero"/>
         <c:crossBetween val="between"/>
       </c:valAx>
@@ -3576,57 +3576,498 @@
       </p:grpSpPr>
       <p:sp>
         <p:nvSpPr>
-          <p:cNvPr id="2" name="Title 1"/>
-          <p:cNvSpPr>
-            <a:spLocks noGrp="1"/>
-          </p:cNvSpPr>
-          <p:nvPr>
-            <p:ph type="ctrTitle"/>
+          <p:cNvPr id="3" name="Subtitle 2"/>
+          <p:cNvSpPr>
+            <a:spLocks noGrp="1"/>
+          </p:cNvSpPr>
+          <p:nvPr>
+            <p:ph type="subTitle" idx="1"/>
           </p:nvPr>
         </p:nvSpPr>
         <p:spPr>
           <a:xfrm>
-            <a:off x="444952" y="1076181"/>
-            <a:ext cx="7772400" cy="1470025"/>
+            <a:off x="3463273" y="3600162"/>
+            <a:ext cx="6400800" cy="1752600"/>
           </a:xfrm>
         </p:spPr>
         <p:txBody>
           <a:bodyPr/>
           <a:lstStyle/>
           <a:p>
+            <a:endParaRPr lang="en-US" dirty="0" smtClean="0"/>
+          </a:p>
+          <a:p>
             <a:r>
               <a:rPr lang="en-US" dirty="0" smtClean="0"/>
-              <a:t>Anatomy of a good test report</a:t>
-            </a:r>
+              <a:t>PRATEEK </a:t>
+            </a:r>
+            <a:r>
+              <a:rPr lang="en-US" dirty="0" smtClean="0"/>
+              <a:t>KUMAR BAHETI</a:t>
+            </a:r>
+          </a:p>
+          <a:p>
             <a:endParaRPr lang="en-US" dirty="0"/>
           </a:p>
         </p:txBody>
       </p:sp>
       <p:sp>
         <p:nvSpPr>
-          <p:cNvPr id="3" name="Subtitle 2"/>
-          <p:cNvSpPr>
-            <a:spLocks noGrp="1"/>
-          </p:cNvSpPr>
-          <p:nvPr>
-            <p:ph type="subTitle" idx="1"/>
-          </p:nvPr>
-        </p:nvSpPr>
-        <p:spPr/>
-        <p:txBody>
-          <a:bodyPr/>
-          <a:lstStyle/>
-          <a:p>
-            <a:endParaRPr lang="en-US" dirty="0" smtClean="0"/>
-          </a:p>
-          <a:p>
-            <a:r>
-              <a:rPr lang="en-US" dirty="0" smtClean="0"/>
-              <a:t>PRATEEK KUMAR BAHETI</a:t>
-            </a:r>
-          </a:p>
-          <a:p>
-            <a:endParaRPr lang="en-US" dirty="0"/>
+          <p:cNvPr id="4" name="Content Placeholder 2"/>
+          <p:cNvSpPr txBox="1">
+            <a:spLocks/>
+          </p:cNvSpPr>
+          <p:nvPr/>
+        </p:nvSpPr>
+        <p:spPr>
+          <a:xfrm>
+            <a:off x="685800" y="594221"/>
+            <a:ext cx="8229600" cy="4876800"/>
+          </a:xfrm>
+          <a:prstGeom prst="rect">
+            <a:avLst/>
+          </a:prstGeom>
+        </p:spPr>
+        <p:txBody>
+          <a:bodyPr vert="horz" lIns="91440" tIns="45720" rIns="91440" bIns="45720" rtlCol="0">
+            <a:normAutofit/>
+          </a:bodyPr>
+          <a:lstStyle>
+            <a:lvl1pPr marL="0" indent="0" algn="l" defTabSz="914400" rtl="0" eaLnBrk="1" latinLnBrk="0" hangingPunct="1">
+              <a:spcBef>
+                <a:spcPct val="20000"/>
+              </a:spcBef>
+              <a:buClr>
+                <a:schemeClr val="accent1"/>
+              </a:buClr>
+              <a:buSzPct val="85000"/>
+              <a:buFont typeface="Arial" pitchFamily="34" charset="0"/>
+              <a:buNone/>
+              <a:defRPr sz="2400" kern="1200">
+                <a:solidFill>
+                  <a:schemeClr val="tx1">
+                    <a:lumMod val="75000"/>
+                    <a:lumOff val="25000"/>
+                  </a:schemeClr>
+                </a:solidFill>
+                <a:latin typeface="+mn-lt"/>
+                <a:ea typeface="+mn-ea"/>
+                <a:cs typeface="+mn-cs"/>
+              </a:defRPr>
+            </a:lvl1pPr>
+            <a:lvl2pPr marL="457200" indent="0" algn="ctr" defTabSz="914400" rtl="0" eaLnBrk="1" latinLnBrk="0" hangingPunct="1">
+              <a:spcBef>
+                <a:spcPct val="20000"/>
+              </a:spcBef>
+              <a:buClr>
+                <a:schemeClr val="accent1"/>
+              </a:buClr>
+              <a:buSzPct val="85000"/>
+              <a:buFont typeface="Arial" pitchFamily="34" charset="0"/>
+              <a:buNone/>
+              <a:defRPr sz="2000" kern="1200">
+                <a:solidFill>
+                  <a:schemeClr val="tx1">
+                    <a:tint val="75000"/>
+                  </a:schemeClr>
+                </a:solidFill>
+                <a:latin typeface="+mn-lt"/>
+                <a:ea typeface="+mn-ea"/>
+                <a:cs typeface="+mn-cs"/>
+              </a:defRPr>
+            </a:lvl2pPr>
+            <a:lvl3pPr marL="914400" indent="0" algn="ctr" defTabSz="914400" rtl="0" eaLnBrk="1" latinLnBrk="0" hangingPunct="1">
+              <a:spcBef>
+                <a:spcPct val="20000"/>
+              </a:spcBef>
+              <a:buClr>
+                <a:schemeClr val="accent1"/>
+              </a:buClr>
+              <a:buSzPct val="90000"/>
+              <a:buFont typeface="Arial" pitchFamily="34" charset="0"/>
+              <a:buNone/>
+              <a:defRPr sz="1800" kern="1200">
+                <a:solidFill>
+                  <a:schemeClr val="tx1">
+                    <a:tint val="75000"/>
+                  </a:schemeClr>
+                </a:solidFill>
+                <a:latin typeface="+mn-lt"/>
+                <a:ea typeface="+mn-ea"/>
+                <a:cs typeface="+mn-cs"/>
+              </a:defRPr>
+            </a:lvl3pPr>
+            <a:lvl4pPr marL="1371600" indent="0" algn="ctr" defTabSz="914400" rtl="0" eaLnBrk="1" latinLnBrk="0" hangingPunct="1">
+              <a:spcBef>
+                <a:spcPct val="20000"/>
+              </a:spcBef>
+              <a:buClr>
+                <a:schemeClr val="accent1"/>
+              </a:buClr>
+              <a:buFont typeface="Arial" pitchFamily="34" charset="0"/>
+              <a:buNone/>
+              <a:defRPr sz="1600" kern="1200">
+                <a:solidFill>
+                  <a:schemeClr val="tx1">
+                    <a:tint val="75000"/>
+                  </a:schemeClr>
+                </a:solidFill>
+                <a:latin typeface="+mn-lt"/>
+                <a:ea typeface="+mn-ea"/>
+                <a:cs typeface="+mn-cs"/>
+              </a:defRPr>
+            </a:lvl4pPr>
+            <a:lvl5pPr marL="1828800" indent="0" algn="ctr" defTabSz="914400" rtl="0" eaLnBrk="1" latinLnBrk="0" hangingPunct="1">
+              <a:spcBef>
+                <a:spcPct val="20000"/>
+              </a:spcBef>
+              <a:buClr>
+                <a:schemeClr val="accent1"/>
+              </a:buClr>
+              <a:buSzPct val="100000"/>
+              <a:buFont typeface="Arial" pitchFamily="34" charset="0"/>
+              <a:buNone/>
+              <a:defRPr sz="1400" kern="1200" baseline="0">
+                <a:solidFill>
+                  <a:schemeClr val="tx1">
+                    <a:tint val="75000"/>
+                  </a:schemeClr>
+                </a:solidFill>
+                <a:latin typeface="+mn-lt"/>
+                <a:ea typeface="+mn-ea"/>
+                <a:cs typeface="+mn-cs"/>
+              </a:defRPr>
+            </a:lvl5pPr>
+            <a:lvl6pPr marL="2286000" indent="0" algn="ctr" defTabSz="914400" rtl="0" eaLnBrk="1" latinLnBrk="0" hangingPunct="1">
+              <a:spcBef>
+                <a:spcPct val="20000"/>
+              </a:spcBef>
+              <a:buClr>
+                <a:schemeClr val="accent1"/>
+              </a:buClr>
+              <a:buFont typeface="Arial" pitchFamily="34" charset="0"/>
+              <a:buNone/>
+              <a:defRPr sz="1300" kern="1200">
+                <a:solidFill>
+                  <a:schemeClr val="tx1">
+                    <a:tint val="75000"/>
+                  </a:schemeClr>
+                </a:solidFill>
+                <a:latin typeface="+mn-lt"/>
+                <a:ea typeface="+mn-ea"/>
+                <a:cs typeface="+mn-cs"/>
+              </a:defRPr>
+            </a:lvl6pPr>
+            <a:lvl7pPr marL="2743200" indent="0" algn="ctr" defTabSz="914400" rtl="0" eaLnBrk="1" latinLnBrk="0" hangingPunct="1">
+              <a:spcBef>
+                <a:spcPct val="20000"/>
+              </a:spcBef>
+              <a:buClr>
+                <a:schemeClr val="accent1"/>
+              </a:buClr>
+              <a:buFont typeface="Arial" pitchFamily="34" charset="0"/>
+              <a:buNone/>
+              <a:defRPr sz="1300" kern="1200">
+                <a:solidFill>
+                  <a:schemeClr val="tx1">
+                    <a:tint val="75000"/>
+                  </a:schemeClr>
+                </a:solidFill>
+                <a:latin typeface="+mn-lt"/>
+                <a:ea typeface="+mn-ea"/>
+                <a:cs typeface="+mn-cs"/>
+              </a:defRPr>
+            </a:lvl7pPr>
+            <a:lvl8pPr marL="3200400" indent="0" algn="ctr" defTabSz="914400" rtl="0" eaLnBrk="1" latinLnBrk="0" hangingPunct="1">
+              <a:spcBef>
+                <a:spcPct val="20000"/>
+              </a:spcBef>
+              <a:buClr>
+                <a:schemeClr val="accent1"/>
+              </a:buClr>
+              <a:buFont typeface="Arial" pitchFamily="34" charset="0"/>
+              <a:buNone/>
+              <a:defRPr sz="1300" kern="1200">
+                <a:solidFill>
+                  <a:schemeClr val="tx1">
+                    <a:tint val="75000"/>
+                  </a:schemeClr>
+                </a:solidFill>
+                <a:latin typeface="+mn-lt"/>
+                <a:ea typeface="+mn-ea"/>
+                <a:cs typeface="+mn-cs"/>
+              </a:defRPr>
+            </a:lvl8pPr>
+            <a:lvl9pPr marL="3657600" indent="0" algn="ctr" defTabSz="914400" rtl="0" eaLnBrk="1" latinLnBrk="0" hangingPunct="1">
+              <a:spcBef>
+                <a:spcPct val="20000"/>
+              </a:spcBef>
+              <a:buClr>
+                <a:schemeClr val="accent1"/>
+              </a:buClr>
+              <a:buFont typeface="Arial" pitchFamily="34" charset="0"/>
+              <a:buNone/>
+              <a:defRPr sz="1300" kern="1200">
+                <a:solidFill>
+                  <a:schemeClr val="tx1">
+                    <a:tint val="75000"/>
+                  </a:schemeClr>
+                </a:solidFill>
+                <a:latin typeface="+mn-lt"/>
+                <a:ea typeface="+mn-ea"/>
+                <a:cs typeface="+mn-cs"/>
+              </a:defRPr>
+            </a:lvl9pPr>
+          </a:lstStyle>
+          <a:p>
+            <a:endParaRPr lang="en-US" sz="2800" dirty="0" smtClean="0"/>
+          </a:p>
+        </p:txBody>
+      </p:sp>
+      <p:sp>
+        <p:nvSpPr>
+          <p:cNvPr id="5" name="Content Placeholder 2"/>
+          <p:cNvSpPr txBox="1">
+            <a:spLocks/>
+          </p:cNvSpPr>
+          <p:nvPr/>
+        </p:nvSpPr>
+        <p:spPr>
+          <a:xfrm>
+            <a:off x="558311" y="748534"/>
+            <a:ext cx="8229600" cy="4876800"/>
+          </a:xfrm>
+          <a:prstGeom prst="rect">
+            <a:avLst/>
+          </a:prstGeom>
+        </p:spPr>
+        <p:txBody>
+          <a:bodyPr vert="horz" lIns="91440" tIns="45720" rIns="91440" bIns="45720" rtlCol="0">
+            <a:normAutofit/>
+          </a:bodyPr>
+          <a:lstStyle>
+            <a:lvl1pPr marL="0" indent="0" algn="l" defTabSz="914400" rtl="0" eaLnBrk="1" latinLnBrk="0" hangingPunct="1">
+              <a:spcBef>
+                <a:spcPct val="20000"/>
+              </a:spcBef>
+              <a:buClr>
+                <a:schemeClr val="accent1"/>
+              </a:buClr>
+              <a:buSzPct val="85000"/>
+              <a:buFont typeface="Arial" pitchFamily="34" charset="0"/>
+              <a:buNone/>
+              <a:defRPr sz="2400" kern="1200">
+                <a:solidFill>
+                  <a:schemeClr val="tx1">
+                    <a:lumMod val="75000"/>
+                    <a:lumOff val="25000"/>
+                  </a:schemeClr>
+                </a:solidFill>
+                <a:latin typeface="+mn-lt"/>
+                <a:ea typeface="+mn-ea"/>
+                <a:cs typeface="+mn-cs"/>
+              </a:defRPr>
+            </a:lvl1pPr>
+            <a:lvl2pPr marL="457200" indent="0" algn="ctr" defTabSz="914400" rtl="0" eaLnBrk="1" latinLnBrk="0" hangingPunct="1">
+              <a:spcBef>
+                <a:spcPct val="20000"/>
+              </a:spcBef>
+              <a:buClr>
+                <a:schemeClr val="accent1"/>
+              </a:buClr>
+              <a:buSzPct val="85000"/>
+              <a:buFont typeface="Arial" pitchFamily="34" charset="0"/>
+              <a:buNone/>
+              <a:defRPr sz="2000" kern="1200">
+                <a:solidFill>
+                  <a:schemeClr val="tx1">
+                    <a:tint val="75000"/>
+                  </a:schemeClr>
+                </a:solidFill>
+                <a:latin typeface="+mn-lt"/>
+                <a:ea typeface="+mn-ea"/>
+                <a:cs typeface="+mn-cs"/>
+              </a:defRPr>
+            </a:lvl2pPr>
+            <a:lvl3pPr marL="914400" indent="0" algn="ctr" defTabSz="914400" rtl="0" eaLnBrk="1" latinLnBrk="0" hangingPunct="1">
+              <a:spcBef>
+                <a:spcPct val="20000"/>
+              </a:spcBef>
+              <a:buClr>
+                <a:schemeClr val="accent1"/>
+              </a:buClr>
+              <a:buSzPct val="90000"/>
+              <a:buFont typeface="Arial" pitchFamily="34" charset="0"/>
+              <a:buNone/>
+              <a:defRPr sz="1800" kern="1200">
+                <a:solidFill>
+                  <a:schemeClr val="tx1">
+                    <a:tint val="75000"/>
+                  </a:schemeClr>
+                </a:solidFill>
+                <a:latin typeface="+mn-lt"/>
+                <a:ea typeface="+mn-ea"/>
+                <a:cs typeface="+mn-cs"/>
+              </a:defRPr>
+            </a:lvl3pPr>
+            <a:lvl4pPr marL="1371600" indent="0" algn="ctr" defTabSz="914400" rtl="0" eaLnBrk="1" latinLnBrk="0" hangingPunct="1">
+              <a:spcBef>
+                <a:spcPct val="20000"/>
+              </a:spcBef>
+              <a:buClr>
+                <a:schemeClr val="accent1"/>
+              </a:buClr>
+              <a:buFont typeface="Arial" pitchFamily="34" charset="0"/>
+              <a:buNone/>
+              <a:defRPr sz="1600" kern="1200">
+                <a:solidFill>
+                  <a:schemeClr val="tx1">
+                    <a:tint val="75000"/>
+                  </a:schemeClr>
+                </a:solidFill>
+                <a:latin typeface="+mn-lt"/>
+                <a:ea typeface="+mn-ea"/>
+                <a:cs typeface="+mn-cs"/>
+              </a:defRPr>
+            </a:lvl4pPr>
+            <a:lvl5pPr marL="1828800" indent="0" algn="ctr" defTabSz="914400" rtl="0" eaLnBrk="1" latinLnBrk="0" hangingPunct="1">
+              <a:spcBef>
+                <a:spcPct val="20000"/>
+              </a:spcBef>
+              <a:buClr>
+                <a:schemeClr val="accent1"/>
+              </a:buClr>
+              <a:buSzPct val="100000"/>
+              <a:buFont typeface="Arial" pitchFamily="34" charset="0"/>
+              <a:buNone/>
+              <a:defRPr sz="1400" kern="1200" baseline="0">
+                <a:solidFill>
+                  <a:schemeClr val="tx1">
+                    <a:tint val="75000"/>
+                  </a:schemeClr>
+                </a:solidFill>
+                <a:latin typeface="+mn-lt"/>
+                <a:ea typeface="+mn-ea"/>
+                <a:cs typeface="+mn-cs"/>
+              </a:defRPr>
+            </a:lvl5pPr>
+            <a:lvl6pPr marL="2286000" indent="0" algn="ctr" defTabSz="914400" rtl="0" eaLnBrk="1" latinLnBrk="0" hangingPunct="1">
+              <a:spcBef>
+                <a:spcPct val="20000"/>
+              </a:spcBef>
+              <a:buClr>
+                <a:schemeClr val="accent1"/>
+              </a:buClr>
+              <a:buFont typeface="Arial" pitchFamily="34" charset="0"/>
+              <a:buNone/>
+              <a:defRPr sz="1300" kern="1200">
+                <a:solidFill>
+                  <a:schemeClr val="tx1">
+                    <a:tint val="75000"/>
+                  </a:schemeClr>
+                </a:solidFill>
+                <a:latin typeface="+mn-lt"/>
+                <a:ea typeface="+mn-ea"/>
+                <a:cs typeface="+mn-cs"/>
+              </a:defRPr>
+            </a:lvl6pPr>
+            <a:lvl7pPr marL="2743200" indent="0" algn="ctr" defTabSz="914400" rtl="0" eaLnBrk="1" latinLnBrk="0" hangingPunct="1">
+              <a:spcBef>
+                <a:spcPct val="20000"/>
+              </a:spcBef>
+              <a:buClr>
+                <a:schemeClr val="accent1"/>
+              </a:buClr>
+              <a:buFont typeface="Arial" pitchFamily="34" charset="0"/>
+              <a:buNone/>
+              <a:defRPr sz="1300" kern="1200">
+                <a:solidFill>
+                  <a:schemeClr val="tx1">
+                    <a:tint val="75000"/>
+                  </a:schemeClr>
+                </a:solidFill>
+                <a:latin typeface="+mn-lt"/>
+                <a:ea typeface="+mn-ea"/>
+                <a:cs typeface="+mn-cs"/>
+              </a:defRPr>
+            </a:lvl7pPr>
+            <a:lvl8pPr marL="3200400" indent="0" algn="ctr" defTabSz="914400" rtl="0" eaLnBrk="1" latinLnBrk="0" hangingPunct="1">
+              <a:spcBef>
+                <a:spcPct val="20000"/>
+              </a:spcBef>
+              <a:buClr>
+                <a:schemeClr val="accent1"/>
+              </a:buClr>
+              <a:buFont typeface="Arial" pitchFamily="34" charset="0"/>
+              <a:buNone/>
+              <a:defRPr sz="1300" kern="1200">
+                <a:solidFill>
+                  <a:schemeClr val="tx1">
+                    <a:tint val="75000"/>
+                  </a:schemeClr>
+                </a:solidFill>
+                <a:latin typeface="+mn-lt"/>
+                <a:ea typeface="+mn-ea"/>
+                <a:cs typeface="+mn-cs"/>
+              </a:defRPr>
+            </a:lvl8pPr>
+            <a:lvl9pPr marL="3657600" indent="0" algn="ctr" defTabSz="914400" rtl="0" eaLnBrk="1" latinLnBrk="0" hangingPunct="1">
+              <a:spcBef>
+                <a:spcPct val="20000"/>
+              </a:spcBef>
+              <a:buClr>
+                <a:schemeClr val="accent1"/>
+              </a:buClr>
+              <a:buFont typeface="Arial" pitchFamily="34" charset="0"/>
+              <a:buNone/>
+              <a:defRPr sz="1300" kern="1200">
+                <a:solidFill>
+                  <a:schemeClr val="tx1">
+                    <a:tint val="75000"/>
+                  </a:schemeClr>
+                </a:solidFill>
+                <a:latin typeface="+mn-lt"/>
+                <a:ea typeface="+mn-ea"/>
+                <a:cs typeface="+mn-cs"/>
+              </a:defRPr>
+            </a:lvl9pPr>
+          </a:lstStyle>
+          <a:p>
+            <a:r>
+              <a:rPr lang="en-US" sz="4400" dirty="0" smtClean="0">
+                <a:solidFill>
+                  <a:srgbClr val="FF0000"/>
+                </a:solidFill>
+                <a:latin typeface="Arial (headings)"/>
+                <a:cs typeface="Arial (headings)"/>
+              </a:rPr>
+              <a:t>Functional Test Reporting: </a:t>
+            </a:r>
+          </a:p>
+          <a:p>
+            <a:r>
+              <a:rPr lang="en-US" sz="3200" dirty="0" smtClean="0">
+                <a:solidFill>
+                  <a:srgbClr val="FF0000"/>
+                </a:solidFill>
+              </a:rPr>
+              <a:t>- Moving Beyond Test Percentage </a:t>
+            </a:r>
+          </a:p>
+          <a:p>
+            <a:r>
+              <a:rPr lang="en-US" sz="3200" dirty="0" smtClean="0">
+                <a:solidFill>
+                  <a:srgbClr val="FF0000"/>
+                </a:solidFill>
+              </a:rPr>
+              <a:t>- The Anatomy of a good report</a:t>
+            </a:r>
+            <a:endParaRPr lang="en-US" sz="3200" dirty="0">
+              <a:solidFill>
+                <a:srgbClr val="FF0000"/>
+              </a:solidFill>
+            </a:endParaRPr>
           </a:p>
         </p:txBody>
       </p:sp>
@@ -3640,6 +4081,13 @@
   <p:clrMapOvr>
     <a:masterClrMapping/>
   </p:clrMapOvr>
+  <p:timing>
+    <p:tnLst>
+      <p:par>
+        <p:cTn xmlns:p14="http://schemas.microsoft.com/office/powerpoint/2010/main" id="1" dur="indefinite" restart="never" nodeType="tmRoot"/>
+      </p:par>
+    </p:tnLst>
+  </p:timing>
 </p:sld>
 </file>
 
@@ -3762,15 +4210,7 @@
             <a:pPr algn="ctr"/>
             <a:r>
               <a:rPr lang="en-US" dirty="0" smtClean="0"/>
-              <a:t>Analyzing </a:t>
-            </a:r>
-            <a:r>
-              <a:rPr lang="en-US" dirty="0" smtClean="0"/>
-              <a:t>features covered in tests</a:t>
-            </a:r>
-            <a:r>
-              <a:rPr lang="en-US" dirty="0" smtClean="0"/>
-              <a:t>.</a:t>
+              <a:t>Analyzing features covered in tests.</a:t>
             </a:r>
             <a:endParaRPr lang="en-US" dirty="0"/>
           </a:p>
@@ -4264,30 +4704,30 @@
         </p:spPr>
         <p:txBody>
           <a:bodyPr>
-            <a:normAutofit fontScale="90000"/>
+            <a:noAutofit/>
           </a:bodyPr>
           <a:lstStyle/>
           <a:p>
             <a:pPr algn="ctr"/>
             <a:r>
-              <a:rPr lang="en-US" dirty="0" smtClean="0"/>
+              <a:rPr lang="en-US" sz="4400" dirty="0" smtClean="0"/>
               <a:t>Tests are meant to check </a:t>
             </a:r>
             <a:br>
-              <a:rPr lang="en-US" dirty="0" smtClean="0"/>
+              <a:rPr lang="en-US" sz="4400" dirty="0" smtClean="0"/>
             </a:br>
             <a:r>
-              <a:rPr lang="en-US" dirty="0"/>
+              <a:rPr lang="en-US" sz="4400" dirty="0"/>
               <a:t/>
             </a:r>
             <a:br>
-              <a:rPr lang="en-US" dirty="0"/>
+              <a:rPr lang="en-US" sz="4400" dirty="0"/>
             </a:br>
             <a:r>
-              <a:rPr lang="en-US" dirty="0" smtClean="0"/>
+              <a:rPr lang="en-US" sz="4400" dirty="0" smtClean="0"/>
               <a:t>REGRESSION</a:t>
             </a:r>
-            <a:endParaRPr lang="en-US" dirty="0"/>
+            <a:endParaRPr lang="en-US" sz="4400" dirty="0"/>
           </a:p>
         </p:txBody>
       </p:sp>
@@ -4582,7 +5022,7 @@
         </p:blipFill>
         <p:spPr>
           <a:xfrm>
-            <a:off x="5669833" y="1346136"/>
+            <a:off x="5669833" y="1536059"/>
             <a:ext cx="3033525" cy="3921176"/>
           </a:xfrm>
           <a:prstGeom prst="rect">
@@ -4806,7 +5246,7 @@
         </p:nvSpPr>
         <p:spPr>
           <a:xfrm>
-            <a:off x="4991157" y="329116"/>
+            <a:off x="4991157" y="331239"/>
             <a:ext cx="4152843" cy="1752600"/>
           </a:xfrm>
           <a:prstGeom prst="rect">
@@ -4994,8 +5434,18 @@
             </a:pPr>
             <a:r>
               <a:rPr lang="en-US" dirty="0" smtClean="0"/>
-              <a:t>ANALYZING TESTS</a:t>
-            </a:r>
+              <a:t>ANALYZING </a:t>
+            </a:r>
+            <a:r>
+              <a:rPr lang="en-US" dirty="0" smtClean="0"/>
+              <a:t>FAILURES</a:t>
+            </a:r>
+          </a:p>
+          <a:p>
+            <a:pPr marL="0" indent="0">
+              <a:buNone/>
+            </a:pPr>
+            <a:endParaRPr lang="en-US" dirty="0" smtClean="0"/>
           </a:p>
           <a:p>
             <a:endParaRPr lang="en-US" dirty="0"/>
@@ -5036,6 +5486,13 @@
   <p:clrMapOvr>
     <a:masterClrMapping/>
   </p:clrMapOvr>
+  <p:timing>
+    <p:tnLst>
+      <p:par>
+        <p:cTn xmlns:p14="http://schemas.microsoft.com/office/powerpoint/2010/main" id="1" dur="indefinite" restart="never" nodeType="tmRoot"/>
+      </p:par>
+    </p:tnLst>
+  </p:timing>
 </p:sld>
 </file>
 
@@ -5098,7 +5555,7 @@
         </p:nvSpPr>
         <p:spPr>
           <a:xfrm>
-            <a:off x="457199" y="1852461"/>
+            <a:off x="463355" y="1852461"/>
             <a:ext cx="8229600" cy="4876800"/>
           </a:xfrm>
         </p:spPr>
@@ -5173,6 +5630,13 @@
   <p:clrMapOvr>
     <a:masterClrMapping/>
   </p:clrMapOvr>
+  <p:timing>
+    <p:tnLst>
+      <p:par>
+        <p:cTn xmlns:p14="http://schemas.microsoft.com/office/powerpoint/2010/main" id="1" dur="indefinite" restart="never" nodeType="tmRoot"/>
+      </p:par>
+    </p:tnLst>
+  </p:timing>
 </p:sld>
 </file>
 
@@ -5256,6 +5720,13 @@
   <p:clrMapOvr>
     <a:masterClrMapping/>
   </p:clrMapOvr>
+  <p:timing>
+    <p:tnLst>
+      <p:par>
+        <p:cTn xmlns:p14="http://schemas.microsoft.com/office/powerpoint/2010/main" id="1" dur="indefinite" restart="never" nodeType="tmRoot"/>
+      </p:par>
+    </p:tnLst>
+  </p:timing>
 </p:sld>
 </file>
 
@@ -5632,19 +6103,7 @@
             <a:pPr algn="ctr"/>
             <a:r>
               <a:rPr lang="en-US" dirty="0" smtClean="0"/>
-              <a:t>Data </a:t>
-            </a:r>
-            <a:r>
-              <a:rPr lang="en-US" dirty="0" smtClean="0"/>
-              <a:t>and</a:t>
-            </a:r>
-            <a:r>
-              <a:rPr lang="en-US" dirty="0" smtClean="0"/>
-              <a:t> </a:t>
-            </a:r>
-            <a:r>
-              <a:rPr lang="en-US" dirty="0" smtClean="0"/>
-              <a:t>Presentation</a:t>
+              <a:t>Data and Presentation</a:t>
             </a:r>
             <a:endParaRPr lang="en-US" dirty="0"/>
           </a:p>

</xml_diff>